<commit_message>
Updating schedule for Lesson 7 and updating the block diagram on lecture 5 slides and Lab 1 supplemental slides.
</commit_message>
<xml_diff>
--- a/lab/lab1/ECE383_Lab1Supplement.pptx
+++ b/lab/lab1/ECE383_Lab1Supplement.pptx
@@ -1058,7 +1058,7 @@
                 </a:solidFill>
               </a:rPr>
               <a:pPr/>
-              <a:t>1/16/2017</a:t>
+              <a:t>1/23/2017</a:t>
             </a:fld>
             <a:endParaRPr lang="en-US">
               <a:solidFill>
@@ -1260,7 +1260,7 @@
                 </a:solidFill>
               </a:rPr>
               <a:pPr/>
-              <a:t>1/16/2017</a:t>
+              <a:t>1/23/2017</a:t>
             </a:fld>
             <a:endParaRPr lang="en-US">
               <a:solidFill>
@@ -1472,7 +1472,7 @@
                 </a:solidFill>
               </a:rPr>
               <a:pPr/>
-              <a:t>1/16/2017</a:t>
+              <a:t>1/23/2017</a:t>
             </a:fld>
             <a:endParaRPr lang="en-US">
               <a:solidFill>
@@ -1970,7 +1970,7 @@
                 </a:spcAft>
                 <a:defRPr/>
               </a:pPr>
-              <a:t>16 January 2017</a:t>
+              <a:t>23 January 2017</a:t>
             </a:fld>
             <a:endParaRPr lang="en-US" sz="1800">
               <a:solidFill>
@@ -2235,7 +2235,7 @@
                 </a:spcAft>
                 <a:defRPr/>
               </a:pPr>
-              <a:t>16 January 2017</a:t>
+              <a:t>23 January 2017</a:t>
             </a:fld>
             <a:endParaRPr lang="en-US" sz="1800">
               <a:solidFill>
@@ -2589,7 +2589,7 @@
                 </a:spcAft>
                 <a:defRPr/>
               </a:pPr>
-              <a:t>16 January 2017</a:t>
+              <a:t>23 January 2017</a:t>
             </a:fld>
             <a:endParaRPr lang="en-US" sz="1800">
               <a:solidFill>
@@ -3082,7 +3082,7 @@
                 </a:spcAft>
                 <a:defRPr/>
               </a:pPr>
-              <a:t>16 January 2017</a:t>
+              <a:t>23 January 2017</a:t>
             </a:fld>
             <a:endParaRPr lang="en-US" sz="1800">
               <a:solidFill>
@@ -3266,7 +3266,7 @@
                 </a:spcAft>
                 <a:defRPr/>
               </a:pPr>
-              <a:t>16 January 2017</a:t>
+              <a:t>23 January 2017</a:t>
             </a:fld>
             <a:endParaRPr lang="en-US" sz="1800">
               <a:solidFill>
@@ -3427,7 +3427,7 @@
                 </a:spcAft>
                 <a:defRPr/>
               </a:pPr>
-              <a:t>16 January 2017</a:t>
+              <a:t>23 January 2017</a:t>
             </a:fld>
             <a:endParaRPr lang="en-US" sz="1800">
               <a:solidFill>
@@ -3770,7 +3770,7 @@
                 </a:spcAft>
                 <a:defRPr/>
               </a:pPr>
-              <a:t>16 January 2017</a:t>
+              <a:t>23 January 2017</a:t>
             </a:fld>
             <a:endParaRPr lang="en-US" sz="1800">
               <a:solidFill>
@@ -3909,7 +3909,7 @@
                 </a:solidFill>
               </a:rPr>
               <a:pPr/>
-              <a:t>1/16/2017</a:t>
+              <a:t>1/23/2017</a:t>
             </a:fld>
             <a:endParaRPr lang="en-US">
               <a:solidFill>
@@ -4292,7 +4292,7 @@
                 </a:spcAft>
                 <a:defRPr/>
               </a:pPr>
-              <a:t>16 January 2017</a:t>
+              <a:t>23 January 2017</a:t>
             </a:fld>
             <a:endParaRPr lang="en-US" sz="1800">
               <a:solidFill>
@@ -4528,7 +4528,7 @@
                 </a:spcAft>
                 <a:defRPr/>
               </a:pPr>
-              <a:t>16 January 2017</a:t>
+              <a:t>23 January 2017</a:t>
             </a:fld>
             <a:endParaRPr lang="en-US" sz="1800">
               <a:solidFill>
@@ -4774,7 +4774,7 @@
                 </a:spcAft>
                 <a:defRPr/>
               </a:pPr>
-              <a:t>16 January 2017</a:t>
+              <a:t>23 January 2017</a:t>
             </a:fld>
             <a:endParaRPr lang="en-US" sz="1800">
               <a:solidFill>
@@ -4988,7 +4988,7 @@
                 </a:spcAft>
                 <a:defRPr/>
               </a:pPr>
-              <a:t>16 January 2017</a:t>
+              <a:t>23 January 2017</a:t>
             </a:fld>
             <a:endParaRPr lang="en-US" sz="1800">
               <a:solidFill>
@@ -5203,7 +5203,7 @@
                 </a:solidFill>
               </a:rPr>
               <a:pPr/>
-              <a:t>1/16/2017</a:t>
+              <a:t>1/23/2017</a:t>
             </a:fld>
             <a:endParaRPr lang="en-US">
               <a:solidFill>
@@ -5523,7 +5523,7 @@
                 </a:solidFill>
               </a:rPr>
               <a:pPr/>
-              <a:t>1/16/2017</a:t>
+              <a:t>1/23/2017</a:t>
             </a:fld>
             <a:endParaRPr lang="en-US">
               <a:solidFill>
@@ -5977,7 +5977,7 @@
                 </a:solidFill>
               </a:rPr>
               <a:pPr/>
-              <a:t>1/16/2017</a:t>
+              <a:t>1/23/2017</a:t>
             </a:fld>
             <a:endParaRPr lang="en-US">
               <a:solidFill>
@@ -6127,7 +6127,7 @@
                 </a:solidFill>
               </a:rPr>
               <a:pPr/>
-              <a:t>1/16/2017</a:t>
+              <a:t>1/23/2017</a:t>
             </a:fld>
             <a:endParaRPr lang="en-US">
               <a:solidFill>
@@ -6254,7 +6254,7 @@
                 </a:solidFill>
               </a:rPr>
               <a:pPr/>
-              <a:t>1/16/2017</a:t>
+              <a:t>1/23/2017</a:t>
             </a:fld>
             <a:endParaRPr lang="en-US">
               <a:solidFill>
@@ -6563,7 +6563,7 @@
                 </a:solidFill>
               </a:rPr>
               <a:pPr/>
-              <a:t>1/16/2017</a:t>
+              <a:t>1/23/2017</a:t>
             </a:fld>
             <a:endParaRPr lang="en-US">
               <a:solidFill>
@@ -6848,7 +6848,7 @@
                 </a:solidFill>
               </a:rPr>
               <a:pPr/>
-              <a:t>1/16/2017</a:t>
+              <a:t>1/23/2017</a:t>
             </a:fld>
             <a:endParaRPr lang="en-US">
               <a:solidFill>
@@ -7109,7 +7109,7 @@
                   <a:spcPts val="0"/>
                 </a:spcAft>
               </a:pPr>
-              <a:t>1/16/2017</a:t>
+              <a:t>1/23/2017</a:t>
             </a:fld>
             <a:endParaRPr lang="en-US">
               <a:solidFill>
@@ -9191,7 +9191,7 @@
                 </a:spcAft>
                 <a:defRPr/>
               </a:pPr>
-              <a:t>16 January 2017</a:t>
+              <a:t>23 January 2017</a:t>
             </a:fld>
             <a:endParaRPr lang="en-US" sz="1800">
               <a:solidFill>
@@ -9559,7 +9559,7 @@
                 </a:spcAft>
                 <a:defRPr/>
               </a:pPr>
-              <a:t>16 January 2017</a:t>
+              <a:t>23 January 2017</a:t>
             </a:fld>
             <a:endParaRPr lang="en-US" sz="1800">
               <a:solidFill>
@@ -10145,7 +10145,7 @@
                 </a:spcAft>
                 <a:defRPr/>
               </a:pPr>
-              <a:t>16 January 2017</a:t>
+              <a:t>23 January 2017</a:t>
             </a:fld>
             <a:endParaRPr lang="en-US" sz="1800">
               <a:solidFill>
@@ -10379,7 +10379,7 @@
                 </a:spcAft>
                 <a:defRPr/>
               </a:pPr>
-              <a:t>16 January 2017</a:t>
+              <a:t>23 January 2017</a:t>
             </a:fld>
             <a:endParaRPr lang="en-US" sz="1800">
               <a:solidFill>
@@ -11292,7 +11292,7 @@
                 </a:spcAft>
                 <a:defRPr/>
               </a:pPr>
-              <a:t>16 January 2017</a:t>
+              <a:t>23 January 2017</a:t>
             </a:fld>
             <a:endParaRPr lang="en-US" sz="1800">
               <a:solidFill>
@@ -11526,7 +11526,7 @@
                 </a:spcAft>
                 <a:defRPr/>
               </a:pPr>
-              <a:t>16 January 2017</a:t>
+              <a:t>23 January 2017</a:t>
             </a:fld>
             <a:endParaRPr lang="en-US" sz="1800">
               <a:solidFill>
@@ -11760,7 +11760,7 @@
                 </a:spcAft>
                 <a:defRPr/>
               </a:pPr>
-              <a:t>16 January 2017</a:t>
+              <a:t>23 January 2017</a:t>
             </a:fld>
             <a:endParaRPr lang="en-US" sz="1800">
               <a:solidFill>
@@ -12334,7 +12334,7 @@
                 </a:spcAft>
                 <a:defRPr/>
               </a:pPr>
-              <a:t>16 January 2017</a:t>
+              <a:t>23 January 2017</a:t>
             </a:fld>
             <a:endParaRPr lang="en-US" sz="1800">
               <a:solidFill>
@@ -12814,7 +12814,7 @@
                 </a:spcAft>
                 <a:defRPr/>
               </a:pPr>
-              <a:t>16 January 2017</a:t>
+              <a:t>23 January 2017</a:t>
             </a:fld>
             <a:endParaRPr lang="en-US" sz="1800">
               <a:solidFill>
@@ -13539,7 +13539,7 @@
                 </a:spcAft>
                 <a:defRPr/>
               </a:pPr>
-              <a:t>16 January 2017</a:t>
+              <a:t>23 January 2017</a:t>
             </a:fld>
             <a:endParaRPr lang="en-US" sz="1800">
               <a:solidFill>
@@ -15832,7 +15832,7 @@
                 </a:spcAft>
                 <a:defRPr/>
               </a:pPr>
-              <a:t>16 January 2017</a:t>
+              <a:t>23 January 2017</a:t>
             </a:fld>
             <a:endParaRPr lang="en-US" sz="1800">
               <a:solidFill>
@@ -16331,7 +16331,7 @@
                 </a:spcAft>
                 <a:defRPr/>
               </a:pPr>
-              <a:t>16 January 2017</a:t>
+              <a:t>23 January 2017</a:t>
             </a:fld>
             <a:endParaRPr lang="en-US" sz="1800">
               <a:solidFill>
@@ -18212,7 +18212,7 @@
                 </a:spcAft>
                 <a:defRPr/>
               </a:pPr>
-              <a:t>16 January 2017</a:t>
+              <a:t>23 January 2017</a:t>
             </a:fld>
             <a:endParaRPr lang="en-US" sz="1800">
               <a:solidFill>
@@ -18370,8 +18370,8 @@
         </p:blipFill>
         <p:spPr bwMode="auto">
           <a:xfrm>
-            <a:off x="3256" y="1539748"/>
-            <a:ext cx="9140744" cy="4816090"/>
+            <a:off x="73923" y="1539748"/>
+            <a:ext cx="8999409" cy="4816090"/>
           </a:xfrm>
           <a:prstGeom prst="rect">
             <a:avLst/>
@@ -18559,7 +18559,7 @@
                 </a:spcAft>
                 <a:defRPr/>
               </a:pPr>
-              <a:t>16 January 2017</a:t>
+              <a:t>23 January 2017</a:t>
             </a:fld>
             <a:endParaRPr lang="en-US" sz="1800">
               <a:solidFill>
@@ -19175,7 +19175,7 @@
                 </a:spcAft>
                 <a:defRPr/>
               </a:pPr>
-              <a:t>16 January 2017</a:t>
+              <a:t>23 January 2017</a:t>
             </a:fld>
             <a:endParaRPr lang="en-US" sz="1800">
               <a:solidFill>

</xml_diff>

<commit_message>
Updating minor errors on the Lab 1 and Lab 2 block diagrams one last time.
</commit_message>
<xml_diff>
--- a/lab/lab1/ECE383_Lab1Supplement.pptx
+++ b/lab/lab1/ECE383_Lab1Supplement.pptx
@@ -1058,7 +1058,7 @@
                 </a:solidFill>
               </a:rPr>
               <a:pPr/>
-              <a:t>1/23/2017</a:t>
+              <a:t>2/8/2017</a:t>
             </a:fld>
             <a:endParaRPr lang="en-US">
               <a:solidFill>
@@ -1260,7 +1260,7 @@
                 </a:solidFill>
               </a:rPr>
               <a:pPr/>
-              <a:t>1/23/2017</a:t>
+              <a:t>2/8/2017</a:t>
             </a:fld>
             <a:endParaRPr lang="en-US">
               <a:solidFill>
@@ -1472,7 +1472,7 @@
                 </a:solidFill>
               </a:rPr>
               <a:pPr/>
-              <a:t>1/23/2017</a:t>
+              <a:t>2/8/2017</a:t>
             </a:fld>
             <a:endParaRPr lang="en-US">
               <a:solidFill>
@@ -1970,7 +1970,7 @@
                 </a:spcAft>
                 <a:defRPr/>
               </a:pPr>
-              <a:t>23 January 2017</a:t>
+              <a:t>8 February 2017</a:t>
             </a:fld>
             <a:endParaRPr lang="en-US" sz="1800">
               <a:solidFill>
@@ -2235,7 +2235,7 @@
                 </a:spcAft>
                 <a:defRPr/>
               </a:pPr>
-              <a:t>23 January 2017</a:t>
+              <a:t>8 February 2017</a:t>
             </a:fld>
             <a:endParaRPr lang="en-US" sz="1800">
               <a:solidFill>
@@ -2589,7 +2589,7 @@
                 </a:spcAft>
                 <a:defRPr/>
               </a:pPr>
-              <a:t>23 January 2017</a:t>
+              <a:t>8 February 2017</a:t>
             </a:fld>
             <a:endParaRPr lang="en-US" sz="1800">
               <a:solidFill>
@@ -3082,7 +3082,7 @@
                 </a:spcAft>
                 <a:defRPr/>
               </a:pPr>
-              <a:t>23 January 2017</a:t>
+              <a:t>8 February 2017</a:t>
             </a:fld>
             <a:endParaRPr lang="en-US" sz="1800">
               <a:solidFill>
@@ -3266,7 +3266,7 @@
                 </a:spcAft>
                 <a:defRPr/>
               </a:pPr>
-              <a:t>23 January 2017</a:t>
+              <a:t>8 February 2017</a:t>
             </a:fld>
             <a:endParaRPr lang="en-US" sz="1800">
               <a:solidFill>
@@ -3427,7 +3427,7 @@
                 </a:spcAft>
                 <a:defRPr/>
               </a:pPr>
-              <a:t>23 January 2017</a:t>
+              <a:t>8 February 2017</a:t>
             </a:fld>
             <a:endParaRPr lang="en-US" sz="1800">
               <a:solidFill>
@@ -3770,7 +3770,7 @@
                 </a:spcAft>
                 <a:defRPr/>
               </a:pPr>
-              <a:t>23 January 2017</a:t>
+              <a:t>8 February 2017</a:t>
             </a:fld>
             <a:endParaRPr lang="en-US" sz="1800">
               <a:solidFill>
@@ -3909,7 +3909,7 @@
                 </a:solidFill>
               </a:rPr>
               <a:pPr/>
-              <a:t>1/23/2017</a:t>
+              <a:t>2/8/2017</a:t>
             </a:fld>
             <a:endParaRPr lang="en-US">
               <a:solidFill>
@@ -4292,7 +4292,7 @@
                 </a:spcAft>
                 <a:defRPr/>
               </a:pPr>
-              <a:t>23 January 2017</a:t>
+              <a:t>8 February 2017</a:t>
             </a:fld>
             <a:endParaRPr lang="en-US" sz="1800">
               <a:solidFill>
@@ -4528,7 +4528,7 @@
                 </a:spcAft>
                 <a:defRPr/>
               </a:pPr>
-              <a:t>23 January 2017</a:t>
+              <a:t>8 February 2017</a:t>
             </a:fld>
             <a:endParaRPr lang="en-US" sz="1800">
               <a:solidFill>
@@ -4774,7 +4774,7 @@
                 </a:spcAft>
                 <a:defRPr/>
               </a:pPr>
-              <a:t>23 January 2017</a:t>
+              <a:t>8 February 2017</a:t>
             </a:fld>
             <a:endParaRPr lang="en-US" sz="1800">
               <a:solidFill>
@@ -4988,7 +4988,7 @@
                 </a:spcAft>
                 <a:defRPr/>
               </a:pPr>
-              <a:t>23 January 2017</a:t>
+              <a:t>8 February 2017</a:t>
             </a:fld>
             <a:endParaRPr lang="en-US" sz="1800">
               <a:solidFill>
@@ -5203,7 +5203,7 @@
                 </a:solidFill>
               </a:rPr>
               <a:pPr/>
-              <a:t>1/23/2017</a:t>
+              <a:t>2/8/2017</a:t>
             </a:fld>
             <a:endParaRPr lang="en-US">
               <a:solidFill>
@@ -5523,7 +5523,7 @@
                 </a:solidFill>
               </a:rPr>
               <a:pPr/>
-              <a:t>1/23/2017</a:t>
+              <a:t>2/8/2017</a:t>
             </a:fld>
             <a:endParaRPr lang="en-US">
               <a:solidFill>
@@ -5977,7 +5977,7 @@
                 </a:solidFill>
               </a:rPr>
               <a:pPr/>
-              <a:t>1/23/2017</a:t>
+              <a:t>2/8/2017</a:t>
             </a:fld>
             <a:endParaRPr lang="en-US">
               <a:solidFill>
@@ -6127,7 +6127,7 @@
                 </a:solidFill>
               </a:rPr>
               <a:pPr/>
-              <a:t>1/23/2017</a:t>
+              <a:t>2/8/2017</a:t>
             </a:fld>
             <a:endParaRPr lang="en-US">
               <a:solidFill>
@@ -6254,7 +6254,7 @@
                 </a:solidFill>
               </a:rPr>
               <a:pPr/>
-              <a:t>1/23/2017</a:t>
+              <a:t>2/8/2017</a:t>
             </a:fld>
             <a:endParaRPr lang="en-US">
               <a:solidFill>
@@ -6563,7 +6563,7 @@
                 </a:solidFill>
               </a:rPr>
               <a:pPr/>
-              <a:t>1/23/2017</a:t>
+              <a:t>2/8/2017</a:t>
             </a:fld>
             <a:endParaRPr lang="en-US">
               <a:solidFill>
@@ -6848,7 +6848,7 @@
                 </a:solidFill>
               </a:rPr>
               <a:pPr/>
-              <a:t>1/23/2017</a:t>
+              <a:t>2/8/2017</a:t>
             </a:fld>
             <a:endParaRPr lang="en-US">
               <a:solidFill>
@@ -7109,7 +7109,7 @@
                   <a:spcPts val="0"/>
                 </a:spcAft>
               </a:pPr>
-              <a:t>1/23/2017</a:t>
+              <a:t>2/8/2017</a:t>
             </a:fld>
             <a:endParaRPr lang="en-US">
               <a:solidFill>
@@ -9191,7 +9191,7 @@
                 </a:spcAft>
                 <a:defRPr/>
               </a:pPr>
-              <a:t>23 January 2017</a:t>
+              <a:t>8 February 2017</a:t>
             </a:fld>
             <a:endParaRPr lang="en-US" sz="1800">
               <a:solidFill>
@@ -9559,7 +9559,7 @@
                 </a:spcAft>
                 <a:defRPr/>
               </a:pPr>
-              <a:t>23 January 2017</a:t>
+              <a:t>8 February 2017</a:t>
             </a:fld>
             <a:endParaRPr lang="en-US" sz="1800">
               <a:solidFill>
@@ -10145,7 +10145,7 @@
                 </a:spcAft>
                 <a:defRPr/>
               </a:pPr>
-              <a:t>23 January 2017</a:t>
+              <a:t>8 February 2017</a:t>
             </a:fld>
             <a:endParaRPr lang="en-US" sz="1800">
               <a:solidFill>
@@ -10379,7 +10379,7 @@
                 </a:spcAft>
                 <a:defRPr/>
               </a:pPr>
-              <a:t>23 January 2017</a:t>
+              <a:t>8 February 2017</a:t>
             </a:fld>
             <a:endParaRPr lang="en-US" sz="1800">
               <a:solidFill>
@@ -11292,7 +11292,7 @@
                 </a:spcAft>
                 <a:defRPr/>
               </a:pPr>
-              <a:t>23 January 2017</a:t>
+              <a:t>8 February 2017</a:t>
             </a:fld>
             <a:endParaRPr lang="en-US" sz="1800">
               <a:solidFill>
@@ -11526,7 +11526,7 @@
                 </a:spcAft>
                 <a:defRPr/>
               </a:pPr>
-              <a:t>23 January 2017</a:t>
+              <a:t>8 February 2017</a:t>
             </a:fld>
             <a:endParaRPr lang="en-US" sz="1800">
               <a:solidFill>
@@ -11760,7 +11760,7 @@
                 </a:spcAft>
                 <a:defRPr/>
               </a:pPr>
-              <a:t>23 January 2017</a:t>
+              <a:t>8 February 2017</a:t>
             </a:fld>
             <a:endParaRPr lang="en-US" sz="1800">
               <a:solidFill>
@@ -12334,7 +12334,7 @@
                 </a:spcAft>
                 <a:defRPr/>
               </a:pPr>
-              <a:t>23 January 2017</a:t>
+              <a:t>8 February 2017</a:t>
             </a:fld>
             <a:endParaRPr lang="en-US" sz="1800">
               <a:solidFill>
@@ -12814,7 +12814,7 @@
                 </a:spcAft>
                 <a:defRPr/>
               </a:pPr>
-              <a:t>23 January 2017</a:t>
+              <a:t>8 February 2017</a:t>
             </a:fld>
             <a:endParaRPr lang="en-US" sz="1800">
               <a:solidFill>
@@ -13539,7 +13539,7 @@
                 </a:spcAft>
                 <a:defRPr/>
               </a:pPr>
-              <a:t>23 January 2017</a:t>
+              <a:t>8 February 2017</a:t>
             </a:fld>
             <a:endParaRPr lang="en-US" sz="1800">
               <a:solidFill>
@@ -15832,7 +15832,7 @@
                 </a:spcAft>
                 <a:defRPr/>
               </a:pPr>
-              <a:t>23 January 2017</a:t>
+              <a:t>8 February 2017</a:t>
             </a:fld>
             <a:endParaRPr lang="en-US" sz="1800">
               <a:solidFill>
@@ -16331,7 +16331,7 @@
                 </a:spcAft>
                 <a:defRPr/>
               </a:pPr>
-              <a:t>23 January 2017</a:t>
+              <a:t>8 February 2017</a:t>
             </a:fld>
             <a:endParaRPr lang="en-US" sz="1800">
               <a:solidFill>
@@ -18212,7 +18212,7 @@
                 </a:spcAft>
                 <a:defRPr/>
               </a:pPr>
-              <a:t>23 January 2017</a:t>
+              <a:t>8 February 2017</a:t>
             </a:fld>
             <a:endParaRPr lang="en-US" sz="1800">
               <a:solidFill>
@@ -18370,8 +18370,8 @@
         </p:blipFill>
         <p:spPr bwMode="auto">
           <a:xfrm>
-            <a:off x="73923" y="1539748"/>
-            <a:ext cx="8999409" cy="4816090"/>
+            <a:off x="242763" y="1539748"/>
+            <a:ext cx="8661728" cy="4816090"/>
           </a:xfrm>
           <a:prstGeom prst="rect">
             <a:avLst/>
@@ -18559,7 +18559,7 @@
                 </a:spcAft>
                 <a:defRPr/>
               </a:pPr>
-              <a:t>23 January 2017</a:t>
+              <a:t>8 February 2017</a:t>
             </a:fld>
             <a:endParaRPr lang="en-US" sz="1800">
               <a:solidFill>
@@ -19175,7 +19175,7 @@
                 </a:spcAft>
                 <a:defRPr/>
               </a:pPr>
-              <a:t>23 January 2017</a:t>
+              <a:t>8 February 2017</a:t>
             </a:fld>
             <a:endParaRPr lang="en-US" sz="1800">
               <a:solidFill>

</xml_diff>